<commit_message>
End of Lecture 20 up to slide 13
</commit_message>
<xml_diff>
--- a/DigitalSystems/Lecture11/pictures/pictures-converted.pptx
+++ b/DigitalSystems/Lecture11/pictures/pictures-converted.pptx
@@ -5,7 +5,7 @@
     <p:sldMasterId id="2147483648" r:id="rId1"/>
   </p:sldMasterIdLst>
   <p:notesMasterIdLst>
-    <p:notesMasterId r:id="rId21"/>
+    <p:notesMasterId r:id="rId22"/>
   </p:notesMasterIdLst>
   <p:sldIdLst>
     <p:sldId id="256" r:id="rId2"/>
@@ -27,6 +27,7 @@
     <p:sldId id="262" r:id="rId18"/>
     <p:sldId id="273" r:id="rId19"/>
     <p:sldId id="274" r:id="rId20"/>
+    <p:sldId id="275" r:id="rId21"/>
   </p:sldIdLst>
   <p:sldSz cx="9144000" cy="6858000" type="screen4x3"/>
   <p:notesSz cx="6858000" cy="9144000"/>
@@ -3568,7 +3569,7 @@
               </a:stretch>
             </p:blipFill>
           </mc:Choice>
-          <mc:Fallback xmlns:p="http://schemas.openxmlformats.org/presentationml/2006/main" xmlns:mv="urn:schemas-microsoft-com:mac:vml" xmlns:mc="http://schemas.openxmlformats.org/markup-compatibility/2006" xmlns:r="http://schemas.openxmlformats.org/officeDocument/2006/relationships" xmlns:a="http://schemas.openxmlformats.org/drawingml/2006/main" xmlns="" xmlns:ma="http://schemas.microsoft.com/office/mac/drawingml/2008/main">
+          <mc:Fallback xmlns:ma="http://schemas.microsoft.com/office/mac/drawingml/2008/main" xmlns="" xmlns:a="http://schemas.openxmlformats.org/drawingml/2006/main" xmlns:r="http://schemas.openxmlformats.org/officeDocument/2006/relationships" xmlns:mc="http://schemas.openxmlformats.org/markup-compatibility/2006" xmlns:mv="urn:schemas-microsoft-com:mac:vml" xmlns:p="http://schemas.openxmlformats.org/presentationml/2006/main">
             <p:blipFill>
               <a:blip r:embed="rId3"/>
               <a:stretch>
@@ -3672,7 +3673,7 @@
               </a:stretch>
             </p:blipFill>
           </mc:Choice>
-          <mc:Fallback xmlns:p="http://schemas.openxmlformats.org/presentationml/2006/main" xmlns:mv="urn:schemas-microsoft-com:mac:vml" xmlns:mc="http://schemas.openxmlformats.org/markup-compatibility/2006" xmlns:r="http://schemas.openxmlformats.org/officeDocument/2006/relationships" xmlns:a="http://schemas.openxmlformats.org/drawingml/2006/main" xmlns="" xmlns:ma="http://schemas.microsoft.com/office/mac/drawingml/2008/main">
+          <mc:Fallback xmlns:ma="http://schemas.microsoft.com/office/mac/drawingml/2008/main" xmlns="" xmlns:a="http://schemas.openxmlformats.org/drawingml/2006/main" xmlns:r="http://schemas.openxmlformats.org/officeDocument/2006/relationships" xmlns:mc="http://schemas.openxmlformats.org/markup-compatibility/2006" xmlns:mv="urn:schemas-microsoft-com:mac:vml" xmlns:p="http://schemas.openxmlformats.org/presentationml/2006/main">
             <p:blipFill>
               <a:blip r:embed="rId5"/>
               <a:stretch>
@@ -3742,7 +3743,7 @@
               </a:stretch>
             </p:blipFill>
           </mc:Choice>
-          <mc:Fallback xmlns:p="http://schemas.openxmlformats.org/presentationml/2006/main" xmlns:mv="urn:schemas-microsoft-com:mac:vml" xmlns:mc="http://schemas.openxmlformats.org/markup-compatibility/2006" xmlns:r="http://schemas.openxmlformats.org/officeDocument/2006/relationships" xmlns:a="http://schemas.openxmlformats.org/drawingml/2006/main" xmlns="" xmlns:ma="http://schemas.microsoft.com/office/mac/drawingml/2008/main">
+          <mc:Fallback xmlns:ma="http://schemas.microsoft.com/office/mac/drawingml/2008/main" xmlns="" xmlns:a="http://schemas.openxmlformats.org/drawingml/2006/main" xmlns:r="http://schemas.openxmlformats.org/officeDocument/2006/relationships" xmlns:mc="http://schemas.openxmlformats.org/markup-compatibility/2006" xmlns:mv="urn:schemas-microsoft-com:mac:vml" xmlns:p="http://schemas.openxmlformats.org/presentationml/2006/main">
             <p:blipFill>
               <a:blip r:embed="rId7"/>
               <a:stretch>
@@ -3846,7 +3847,7 @@
               </a:stretch>
             </p:blipFill>
           </mc:Choice>
-          <mc:Fallback xmlns:p="http://schemas.openxmlformats.org/presentationml/2006/main" xmlns:mv="urn:schemas-microsoft-com:mac:vml" xmlns:mc="http://schemas.openxmlformats.org/markup-compatibility/2006" xmlns:r="http://schemas.openxmlformats.org/officeDocument/2006/relationships" xmlns:a="http://schemas.openxmlformats.org/drawingml/2006/main" xmlns="" xmlns:ma="http://schemas.microsoft.com/office/mac/drawingml/2008/main">
+          <mc:Fallback xmlns:ma="http://schemas.microsoft.com/office/mac/drawingml/2008/main" xmlns="" xmlns:a="http://schemas.openxmlformats.org/drawingml/2006/main" xmlns:r="http://schemas.openxmlformats.org/officeDocument/2006/relationships" xmlns:mc="http://schemas.openxmlformats.org/markup-compatibility/2006" xmlns:mv="urn:schemas-microsoft-com:mac:vml" xmlns:p="http://schemas.openxmlformats.org/presentationml/2006/main">
             <p:blipFill>
               <a:blip r:embed="rId9"/>
               <a:stretch>
@@ -3984,7 +3985,7 @@
               </a:stretch>
             </p:blipFill>
           </mc:Choice>
-          <mc:Fallback xmlns:p="http://schemas.openxmlformats.org/presentationml/2006/main" xmlns:mv="urn:schemas-microsoft-com:mac:vml" xmlns:mc="http://schemas.openxmlformats.org/markup-compatibility/2006" xmlns:r="http://schemas.openxmlformats.org/officeDocument/2006/relationships" xmlns:a="http://schemas.openxmlformats.org/drawingml/2006/main" xmlns="" xmlns:ma="http://schemas.microsoft.com/office/mac/drawingml/2008/main">
+          <mc:Fallback xmlns:ma="http://schemas.microsoft.com/office/mac/drawingml/2008/main" xmlns="" xmlns:a="http://schemas.openxmlformats.org/drawingml/2006/main" xmlns:r="http://schemas.openxmlformats.org/officeDocument/2006/relationships" xmlns:mc="http://schemas.openxmlformats.org/markup-compatibility/2006" xmlns:mv="urn:schemas-microsoft-com:mac:vml" xmlns:p="http://schemas.openxmlformats.org/presentationml/2006/main">
             <p:blipFill>
               <a:blip r:embed="rId11"/>
               <a:stretch>
@@ -4230,7 +4231,7 @@
               </a:stretch>
             </p:blipFill>
           </mc:Choice>
-          <mc:Fallback xmlns:p="http://schemas.openxmlformats.org/presentationml/2006/main" xmlns:mv="urn:schemas-microsoft-com:mac:vml" xmlns:mc="http://schemas.openxmlformats.org/markup-compatibility/2006" xmlns:r="http://schemas.openxmlformats.org/officeDocument/2006/relationships" xmlns:a="http://schemas.openxmlformats.org/drawingml/2006/main" xmlns="" xmlns:ma="http://schemas.microsoft.com/office/mac/drawingml/2008/main">
+          <mc:Fallback xmlns:ma="http://schemas.microsoft.com/office/mac/drawingml/2008/main" xmlns="" xmlns:a="http://schemas.openxmlformats.org/drawingml/2006/main" xmlns:r="http://schemas.openxmlformats.org/officeDocument/2006/relationships" xmlns:mc="http://schemas.openxmlformats.org/markup-compatibility/2006" xmlns:mv="urn:schemas-microsoft-com:mac:vml" xmlns:p="http://schemas.openxmlformats.org/presentationml/2006/main">
             <p:blipFill>
               <a:blip r:embed="rId13"/>
               <a:stretch>
@@ -8544,6 +8545,80 @@
       </p:grpSpPr>
       <p:sp>
         <p:nvSpPr>
+          <p:cNvPr id="91" name="Rectangle 90"/>
+          <p:cNvSpPr/>
+          <p:nvPr/>
+        </p:nvSpPr>
+        <p:spPr>
+          <a:xfrm>
+            <a:off x="4474828" y="4009492"/>
+            <a:ext cx="2787528" cy="1548653"/>
+          </a:xfrm>
+          <a:prstGeom prst="rect">
+            <a:avLst/>
+          </a:prstGeom>
+          <a:solidFill>
+            <a:schemeClr val="bg2">
+              <a:lumMod val="90000"/>
+            </a:schemeClr>
+          </a:solidFill>
+        </p:spPr>
+        <p:style>
+          <a:lnRef idx="1">
+            <a:schemeClr val="accent1"/>
+          </a:lnRef>
+          <a:fillRef idx="3">
+            <a:schemeClr val="accent1"/>
+          </a:fillRef>
+          <a:effectRef idx="2">
+            <a:schemeClr val="accent1"/>
+          </a:effectRef>
+          <a:fontRef idx="minor">
+            <a:schemeClr val="lt1"/>
+          </a:fontRef>
+        </p:style>
+        <p:txBody>
+          <a:bodyPr rtlCol="0" anchor="ctr"/>
+          <a:lstStyle/>
+          <a:p>
+            <a:pPr algn="ctr"/>
+            <a:endParaRPr lang="en-US"/>
+          </a:p>
+        </p:txBody>
+      </p:sp>
+      <p:sp>
+        <p:nvSpPr>
+          <p:cNvPr id="74" name="Left Arrow 73"/>
+          <p:cNvSpPr/>
+          <p:nvPr/>
+        </p:nvSpPr>
+        <p:spPr>
+          <a:xfrm>
+            <a:off x="5380692" y="4673259"/>
+            <a:ext cx="561764" cy="254037"/>
+          </a:xfrm>
+          <a:prstGeom prst="leftArrow">
+            <a:avLst/>
+          </a:prstGeom>
+          <a:ln/>
+        </p:spPr>
+        <p:style>
+          <a:lnRef idx="1">
+            <a:schemeClr val="accent1"/>
+          </a:lnRef>
+          <a:fillRef idx="3">
+            <a:schemeClr val="accent1"/>
+          </a:fillRef>
+          <a:effectRef idx="2">
+            <a:schemeClr val="accent1"/>
+          </a:effectRef>
+          <a:fontRef idx="minor">
+            <a:schemeClr val="lt1"/>
+          </a:fontRef>
+        </p:style>
+      </p:sp>
+      <p:sp>
+        <p:nvSpPr>
           <p:cNvPr id="12" name="Rectangle 11"/>
           <p:cNvSpPr/>
           <p:nvPr/>
@@ -9259,6 +9334,1274 @@
         <p:spPr>
           <a:xfrm>
             <a:off x="4538492" y="1629364"/>
+            <a:ext cx="274434" cy="276999"/>
+          </a:xfrm>
+          <a:prstGeom prst="rect">
+            <a:avLst/>
+          </a:prstGeom>
+          <a:noFill/>
+        </p:spPr>
+        <p:txBody>
+          <a:bodyPr wrap="none" rtlCol="0">
+            <a:spAutoFit/>
+          </a:bodyPr>
+          <a:lstStyle/>
+          <a:p>
+            <a:r>
+              <a:rPr lang="en-US" sz="1200" b="1" dirty="0" err="1" smtClean="0">
+                <a:latin typeface="Times New Roman"/>
+              </a:rPr>
+              <a:t>y</a:t>
+            </a:r>
+            <a:endParaRPr lang="en-US" sz="1200" baseline="-25000" dirty="0">
+              <a:latin typeface="Times New Roman"/>
+            </a:endParaRPr>
+          </a:p>
+        </p:txBody>
+      </p:sp>
+      <p:sp>
+        <p:nvSpPr>
+          <p:cNvPr id="53" name="Rectangle 52"/>
+          <p:cNvSpPr/>
+          <p:nvPr/>
+        </p:nvSpPr>
+        <p:spPr>
+          <a:xfrm>
+            <a:off x="6171396" y="3429000"/>
+            <a:ext cx="630933" cy="453558"/>
+          </a:xfrm>
+          <a:prstGeom prst="rect">
+            <a:avLst/>
+          </a:prstGeom>
+          <a:noFill/>
+          <a:ln>
+            <a:solidFill>
+              <a:schemeClr val="tx1"/>
+            </a:solidFill>
+          </a:ln>
+          <a:effectLst/>
+        </p:spPr>
+        <p:style>
+          <a:lnRef idx="1">
+            <a:schemeClr val="accent1"/>
+          </a:lnRef>
+          <a:fillRef idx="3">
+            <a:schemeClr val="accent1"/>
+          </a:fillRef>
+          <a:effectRef idx="2">
+            <a:schemeClr val="accent1"/>
+          </a:effectRef>
+          <a:fontRef idx="minor">
+            <a:schemeClr val="lt1"/>
+          </a:fontRef>
+        </p:style>
+        <p:txBody>
+          <a:bodyPr rtlCol="0" anchor="ctr"/>
+          <a:lstStyle/>
+          <a:p>
+            <a:pPr algn="ctr"/>
+            <a:endParaRPr lang="en-US"/>
+          </a:p>
+        </p:txBody>
+      </p:sp>
+      <p:sp>
+        <p:nvSpPr>
+          <p:cNvPr id="55" name="TextBox 54"/>
+          <p:cNvSpPr txBox="1"/>
+          <p:nvPr/>
+        </p:nvSpPr>
+        <p:spPr>
+          <a:xfrm>
+            <a:off x="6234229" y="3517280"/>
+            <a:ext cx="505267" cy="276999"/>
+          </a:xfrm>
+          <a:prstGeom prst="rect">
+            <a:avLst/>
+          </a:prstGeom>
+          <a:noFill/>
+        </p:spPr>
+        <p:txBody>
+          <a:bodyPr wrap="none" rtlCol="0">
+            <a:spAutoFit/>
+          </a:bodyPr>
+          <a:lstStyle/>
+          <a:p>
+            <a:r>
+              <a:rPr lang="en-US" sz="1200" dirty="0" smtClean="0">
+                <a:latin typeface="Times New Roman"/>
+              </a:rPr>
+              <a:t>Plant</a:t>
+            </a:r>
+            <a:endParaRPr lang="en-US" sz="1200" baseline="-25000" dirty="0">
+              <a:latin typeface="Times New Roman"/>
+            </a:endParaRPr>
+          </a:p>
+        </p:txBody>
+      </p:sp>
+      <p:sp>
+        <p:nvSpPr>
+          <p:cNvPr id="56" name="Rectangle 55"/>
+          <p:cNvSpPr/>
+          <p:nvPr/>
+        </p:nvSpPr>
+        <p:spPr>
+          <a:xfrm>
+            <a:off x="5942456" y="4488543"/>
+            <a:ext cx="1187946" cy="694238"/>
+          </a:xfrm>
+          <a:prstGeom prst="rect">
+            <a:avLst/>
+          </a:prstGeom>
+          <a:noFill/>
+          <a:ln>
+            <a:solidFill>
+              <a:schemeClr val="tx1"/>
+            </a:solidFill>
+          </a:ln>
+          <a:effectLst/>
+        </p:spPr>
+        <p:style>
+          <a:lnRef idx="1">
+            <a:schemeClr val="accent1"/>
+          </a:lnRef>
+          <a:fillRef idx="3">
+            <a:schemeClr val="accent1"/>
+          </a:fillRef>
+          <a:effectRef idx="2">
+            <a:schemeClr val="accent1"/>
+          </a:effectRef>
+          <a:fontRef idx="minor">
+            <a:schemeClr val="lt1"/>
+          </a:fontRef>
+        </p:style>
+        <p:txBody>
+          <a:bodyPr rtlCol="0" anchor="ctr"/>
+          <a:lstStyle/>
+          <a:p>
+            <a:pPr algn="ctr"/>
+            <a:endParaRPr lang="en-US"/>
+          </a:p>
+        </p:txBody>
+      </p:sp>
+      <p:sp>
+        <p:nvSpPr>
+          <p:cNvPr id="57" name="TextBox 56"/>
+          <p:cNvSpPr txBox="1"/>
+          <p:nvPr/>
+        </p:nvSpPr>
+        <p:spPr>
+          <a:xfrm>
+            <a:off x="6161968" y="4650297"/>
+            <a:ext cx="748923" cy="276999"/>
+          </a:xfrm>
+          <a:prstGeom prst="rect">
+            <a:avLst/>
+          </a:prstGeom>
+          <a:noFill/>
+        </p:spPr>
+        <p:txBody>
+          <a:bodyPr wrap="none" rtlCol="0">
+            <a:spAutoFit/>
+          </a:bodyPr>
+          <a:lstStyle/>
+          <a:p>
+            <a:r>
+              <a:rPr lang="en-US" sz="1200" dirty="0" smtClean="0">
+                <a:latin typeface="Times New Roman"/>
+              </a:rPr>
+              <a:t>Observer</a:t>
+            </a:r>
+            <a:endParaRPr lang="en-US" sz="1200" baseline="-25000" dirty="0">
+              <a:latin typeface="Times New Roman"/>
+            </a:endParaRPr>
+          </a:p>
+        </p:txBody>
+      </p:sp>
+      <p:sp>
+        <p:nvSpPr>
+          <p:cNvPr id="59" name="TextBox 58"/>
+          <p:cNvSpPr txBox="1"/>
+          <p:nvPr/>
+        </p:nvSpPr>
+        <p:spPr>
+          <a:xfrm>
+            <a:off x="5556231" y="4449109"/>
+            <a:ext cx="261610" cy="276999"/>
+          </a:xfrm>
+          <a:prstGeom prst="rect">
+            <a:avLst/>
+          </a:prstGeom>
+          <a:noFill/>
+        </p:spPr>
+        <p:txBody>
+          <a:bodyPr wrap="none" rtlCol="0">
+            <a:spAutoFit/>
+          </a:bodyPr>
+          <a:lstStyle/>
+          <a:p>
+            <a:r>
+              <a:rPr lang="en-US" sz="1200" b="1" dirty="0" err="1" smtClean="0">
+                <a:latin typeface="Times New Roman"/>
+              </a:rPr>
+              <a:t>x</a:t>
+            </a:r>
+            <a:endParaRPr lang="en-US" sz="1200" baseline="-25000" dirty="0">
+              <a:latin typeface="Times New Roman"/>
+            </a:endParaRPr>
+          </a:p>
+        </p:txBody>
+      </p:sp>
+      <p:sp>
+        <p:nvSpPr>
+          <p:cNvPr id="60" name="Rectangle 59"/>
+          <p:cNvSpPr/>
+          <p:nvPr/>
+        </p:nvSpPr>
+        <p:spPr>
+          <a:xfrm>
+            <a:off x="4749759" y="4591461"/>
+            <a:ext cx="630933" cy="453558"/>
+          </a:xfrm>
+          <a:prstGeom prst="rect">
+            <a:avLst/>
+          </a:prstGeom>
+          <a:noFill/>
+          <a:ln>
+            <a:solidFill>
+              <a:schemeClr val="tx1"/>
+            </a:solidFill>
+          </a:ln>
+          <a:effectLst/>
+        </p:spPr>
+        <p:style>
+          <a:lnRef idx="1">
+            <a:schemeClr val="accent1"/>
+          </a:lnRef>
+          <a:fillRef idx="3">
+            <a:schemeClr val="accent1"/>
+          </a:fillRef>
+          <a:effectRef idx="2">
+            <a:schemeClr val="accent1"/>
+          </a:effectRef>
+          <a:fontRef idx="minor">
+            <a:schemeClr val="lt1"/>
+          </a:fontRef>
+        </p:style>
+        <p:txBody>
+          <a:bodyPr rtlCol="0" anchor="ctr"/>
+          <a:lstStyle/>
+          <a:p>
+            <a:pPr algn="ctr"/>
+            <a:endParaRPr lang="en-US"/>
+          </a:p>
+        </p:txBody>
+      </p:sp>
+      <p:cxnSp>
+        <p:nvCxnSpPr>
+          <p:cNvPr id="63" name="Straight Arrow Connector 62"/>
+          <p:cNvCxnSpPr>
+            <a:endCxn id="83" idx="2"/>
+          </p:cNvCxnSpPr>
+          <p:nvPr/>
+        </p:nvCxnSpPr>
+        <p:spPr>
+          <a:xfrm>
+            <a:off x="7130402" y="4818242"/>
+            <a:ext cx="234065" cy="1588"/>
+          </a:xfrm>
+          <a:prstGeom prst="straightConnector1">
+            <a:avLst/>
+          </a:prstGeom>
+          <a:ln w="12700">
+            <a:solidFill>
+              <a:schemeClr val="tx1"/>
+            </a:solidFill>
+            <a:headEnd type="triangle"/>
+            <a:tailEnd type="none"/>
+          </a:ln>
+          <a:effectLst/>
+        </p:spPr>
+        <p:style>
+          <a:lnRef idx="2">
+            <a:schemeClr val="accent1"/>
+          </a:lnRef>
+          <a:fillRef idx="0">
+            <a:schemeClr val="accent1"/>
+          </a:fillRef>
+          <a:effectRef idx="1">
+            <a:schemeClr val="accent1"/>
+          </a:effectRef>
+          <a:fontRef idx="minor">
+            <a:schemeClr val="tx1"/>
+          </a:fontRef>
+        </p:style>
+      </p:cxnSp>
+      <p:cxnSp>
+        <p:nvCxnSpPr>
+          <p:cNvPr id="67" name="Straight Connector 66"/>
+          <p:cNvCxnSpPr/>
+          <p:nvPr/>
+        </p:nvCxnSpPr>
+        <p:spPr>
+          <a:xfrm>
+            <a:off x="6796062" y="3655779"/>
+            <a:ext cx="1099383" cy="1588"/>
+          </a:xfrm>
+          <a:prstGeom prst="line">
+            <a:avLst/>
+          </a:prstGeom>
+          <a:ln w="12700">
+            <a:solidFill>
+              <a:schemeClr val="tx1"/>
+            </a:solidFill>
+            <a:tailEnd type="triangle"/>
+          </a:ln>
+          <a:effectLst/>
+        </p:spPr>
+        <p:style>
+          <a:lnRef idx="2">
+            <a:schemeClr val="accent1"/>
+          </a:lnRef>
+          <a:fillRef idx="0">
+            <a:schemeClr val="accent1"/>
+          </a:fillRef>
+          <a:effectRef idx="1">
+            <a:schemeClr val="accent1"/>
+          </a:effectRef>
+          <a:fontRef idx="minor">
+            <a:schemeClr val="tx1"/>
+          </a:fontRef>
+        </p:style>
+      </p:cxnSp>
+      <p:sp>
+        <p:nvSpPr>
+          <p:cNvPr id="69" name="TextBox 68"/>
+          <p:cNvSpPr txBox="1"/>
+          <p:nvPr/>
+        </p:nvSpPr>
+        <p:spPr>
+          <a:xfrm>
+            <a:off x="5464318" y="3342460"/>
+            <a:ext cx="261610" cy="276999"/>
+          </a:xfrm>
+          <a:prstGeom prst="rect">
+            <a:avLst/>
+          </a:prstGeom>
+          <a:noFill/>
+        </p:spPr>
+        <p:txBody>
+          <a:bodyPr wrap="none" rtlCol="0">
+            <a:spAutoFit/>
+          </a:bodyPr>
+          <a:lstStyle/>
+          <a:p>
+            <a:r>
+              <a:rPr lang="en-US" sz="1200" dirty="0" err="1" smtClean="0">
+                <a:latin typeface="Times New Roman"/>
+              </a:rPr>
+              <a:t>u</a:t>
+            </a:r>
+            <a:endParaRPr lang="en-US" sz="1200" baseline="-25000" dirty="0">
+              <a:latin typeface="Times New Roman"/>
+            </a:endParaRPr>
+          </a:p>
+        </p:txBody>
+      </p:sp>
+      <p:sp>
+        <p:nvSpPr>
+          <p:cNvPr id="70" name="TextBox 69"/>
+          <p:cNvSpPr txBox="1"/>
+          <p:nvPr/>
+        </p:nvSpPr>
+        <p:spPr>
+          <a:xfrm>
+            <a:off x="7874864" y="4633803"/>
+            <a:ext cx="235962" cy="276999"/>
+          </a:xfrm>
+          <a:prstGeom prst="rect">
+            <a:avLst/>
+          </a:prstGeom>
+          <a:noFill/>
+        </p:spPr>
+        <p:txBody>
+          <a:bodyPr wrap="none" rtlCol="0">
+            <a:spAutoFit/>
+          </a:bodyPr>
+          <a:lstStyle/>
+          <a:p>
+            <a:r>
+              <a:rPr lang="en-US" sz="1200" dirty="0" err="1" smtClean="0">
+                <a:latin typeface="Times New Roman"/>
+              </a:rPr>
+              <a:t>r</a:t>
+            </a:r>
+            <a:endParaRPr lang="en-US" sz="1200" baseline="-25000" dirty="0">
+              <a:latin typeface="Times New Roman"/>
+            </a:endParaRPr>
+          </a:p>
+        </p:txBody>
+      </p:sp>
+      <p:graphicFrame>
+        <p:nvGraphicFramePr>
+          <p:cNvPr id="72" name="Object 71"/>
+          <p:cNvGraphicFramePr>
+            <a:graphicFrameLocks noChangeAspect="1"/>
+          </p:cNvGraphicFramePr>
+          <p:nvPr/>
+        </p:nvGraphicFramePr>
+        <p:xfrm>
+          <a:off x="4938226" y="4726108"/>
+          <a:ext cx="254000" cy="152400"/>
+        </p:xfrm>
+        <a:graphic>
+          <a:graphicData uri="http://schemas.openxmlformats.org/presentationml/2006/ole">
+            <p:oleObj spid="_x0000_s49154" name="Equation" r:id="rId3" imgW="254000" imgH="152400" progId="Equation.DSMT4">
+              <p:embed/>
+            </p:oleObj>
+          </a:graphicData>
+        </a:graphic>
+      </p:graphicFrame>
+      <p:cxnSp>
+        <p:nvCxnSpPr>
+          <p:cNvPr id="77" name="Elbow Connector 76"/>
+          <p:cNvCxnSpPr>
+            <a:stCxn id="60" idx="1"/>
+            <a:endCxn id="53" idx="1"/>
+          </p:cNvCxnSpPr>
+          <p:nvPr/>
+        </p:nvCxnSpPr>
+        <p:spPr>
+          <a:xfrm rot="10800000" flipH="1">
+            <a:off x="4749758" y="3655780"/>
+            <a:ext cx="1421637" cy="1162461"/>
+          </a:xfrm>
+          <a:prstGeom prst="bentConnector3">
+            <a:avLst>
+              <a:gd name="adj1" fmla="val -39285"/>
+            </a:avLst>
+          </a:prstGeom>
+          <a:ln w="12700">
+            <a:solidFill>
+              <a:schemeClr val="tx1"/>
+            </a:solidFill>
+            <a:tailEnd type="triangle"/>
+          </a:ln>
+          <a:effectLst/>
+        </p:spPr>
+        <p:style>
+          <a:lnRef idx="2">
+            <a:schemeClr val="accent1"/>
+          </a:lnRef>
+          <a:fillRef idx="0">
+            <a:schemeClr val="accent1"/>
+          </a:fillRef>
+          <a:effectRef idx="1">
+            <a:schemeClr val="accent1"/>
+          </a:effectRef>
+          <a:fontRef idx="minor">
+            <a:schemeClr val="tx1"/>
+          </a:fontRef>
+        </p:style>
+      </p:cxnSp>
+      <p:cxnSp>
+        <p:nvCxnSpPr>
+          <p:cNvPr id="80" name="Shape 79"/>
+          <p:cNvCxnSpPr>
+            <a:endCxn id="56" idx="0"/>
+          </p:cNvCxnSpPr>
+          <p:nvPr/>
+        </p:nvCxnSpPr>
+        <p:spPr>
+          <a:xfrm>
+            <a:off x="4188278" y="4147992"/>
+            <a:ext cx="2348151" cy="340551"/>
+          </a:xfrm>
+          <a:prstGeom prst="bentConnector2">
+            <a:avLst/>
+          </a:prstGeom>
+          <a:ln w="12700">
+            <a:solidFill>
+              <a:schemeClr val="tx1"/>
+            </a:solidFill>
+            <a:tailEnd type="triangle"/>
+          </a:ln>
+          <a:effectLst/>
+        </p:spPr>
+        <p:style>
+          <a:lnRef idx="2">
+            <a:schemeClr val="accent1"/>
+          </a:lnRef>
+          <a:fillRef idx="0">
+            <a:schemeClr val="accent1"/>
+          </a:fillRef>
+          <a:effectRef idx="1">
+            <a:schemeClr val="accent1"/>
+          </a:effectRef>
+          <a:fontRef idx="minor">
+            <a:schemeClr val="tx1"/>
+          </a:fontRef>
+        </p:style>
+      </p:cxnSp>
+      <p:sp>
+        <p:nvSpPr>
+          <p:cNvPr id="83" name="Oval 82"/>
+          <p:cNvSpPr/>
+          <p:nvPr/>
+        </p:nvSpPr>
+        <p:spPr>
+          <a:xfrm>
+            <a:off x="7364467" y="4680576"/>
+            <a:ext cx="278507" cy="278507"/>
+          </a:xfrm>
+          <a:prstGeom prst="ellipse">
+            <a:avLst/>
+          </a:prstGeom>
+          <a:noFill/>
+          <a:ln>
+            <a:solidFill>
+              <a:schemeClr val="tx1"/>
+            </a:solidFill>
+          </a:ln>
+        </p:spPr>
+        <p:style>
+          <a:lnRef idx="1">
+            <a:schemeClr val="accent1"/>
+          </a:lnRef>
+          <a:fillRef idx="3">
+            <a:schemeClr val="accent1"/>
+          </a:fillRef>
+          <a:effectRef idx="2">
+            <a:schemeClr val="accent1"/>
+          </a:effectRef>
+          <a:fontRef idx="minor">
+            <a:schemeClr val="lt1"/>
+          </a:fontRef>
+        </p:style>
+        <p:txBody>
+          <a:bodyPr rtlCol="0" anchor="ctr"/>
+          <a:lstStyle/>
+          <a:p>
+            <a:pPr algn="ctr"/>
+            <a:endParaRPr lang="en-US"/>
+          </a:p>
+        </p:txBody>
+      </p:sp>
+      <p:cxnSp>
+        <p:nvCxnSpPr>
+          <p:cNvPr id="85" name="Straight Arrow Connector 84"/>
+          <p:cNvCxnSpPr>
+            <a:stCxn id="83" idx="0"/>
+          </p:cNvCxnSpPr>
+          <p:nvPr/>
+        </p:nvCxnSpPr>
+        <p:spPr>
+          <a:xfrm rot="5400000" flipH="1" flipV="1">
+            <a:off x="6997897" y="4161606"/>
+            <a:ext cx="1024795" cy="13146"/>
+          </a:xfrm>
+          <a:prstGeom prst="straightConnector1">
+            <a:avLst/>
+          </a:prstGeom>
+          <a:ln w="12700">
+            <a:solidFill>
+              <a:schemeClr val="tx1"/>
+            </a:solidFill>
+            <a:headEnd type="triangle"/>
+            <a:tailEnd type="none"/>
+          </a:ln>
+          <a:effectLst/>
+        </p:spPr>
+        <p:style>
+          <a:lnRef idx="2">
+            <a:schemeClr val="accent1"/>
+          </a:lnRef>
+          <a:fillRef idx="0">
+            <a:schemeClr val="accent1"/>
+          </a:fillRef>
+          <a:effectRef idx="1">
+            <a:schemeClr val="accent1"/>
+          </a:effectRef>
+          <a:fontRef idx="minor">
+            <a:schemeClr val="tx1"/>
+          </a:fontRef>
+        </p:style>
+      </p:cxnSp>
+      <p:cxnSp>
+        <p:nvCxnSpPr>
+          <p:cNvPr id="88" name="Straight Arrow Connector 87"/>
+          <p:cNvCxnSpPr/>
+          <p:nvPr/>
+        </p:nvCxnSpPr>
+        <p:spPr>
+          <a:xfrm>
+            <a:off x="7661380" y="4816652"/>
+            <a:ext cx="234065" cy="1588"/>
+          </a:xfrm>
+          <a:prstGeom prst="straightConnector1">
+            <a:avLst/>
+          </a:prstGeom>
+          <a:ln w="12700">
+            <a:solidFill>
+              <a:schemeClr val="tx1"/>
+            </a:solidFill>
+            <a:headEnd type="triangle"/>
+            <a:tailEnd type="none"/>
+          </a:ln>
+          <a:effectLst/>
+        </p:spPr>
+        <p:style>
+          <a:lnRef idx="2">
+            <a:schemeClr val="accent1"/>
+          </a:lnRef>
+          <a:fillRef idx="0">
+            <a:schemeClr val="accent1"/>
+          </a:fillRef>
+          <a:effectRef idx="1">
+            <a:schemeClr val="accent1"/>
+          </a:effectRef>
+          <a:fontRef idx="minor">
+            <a:schemeClr val="tx1"/>
+          </a:fontRef>
+        </p:style>
+      </p:cxnSp>
+      <p:sp>
+        <p:nvSpPr>
+          <p:cNvPr id="89" name="TextBox 88"/>
+          <p:cNvSpPr txBox="1"/>
+          <p:nvPr/>
+        </p:nvSpPr>
+        <p:spPr>
+          <a:xfrm>
+            <a:off x="7874864" y="3480960"/>
+            <a:ext cx="274434" cy="276999"/>
+          </a:xfrm>
+          <a:prstGeom prst="rect">
+            <a:avLst/>
+          </a:prstGeom>
+          <a:noFill/>
+        </p:spPr>
+        <p:txBody>
+          <a:bodyPr wrap="none" rtlCol="0">
+            <a:spAutoFit/>
+          </a:bodyPr>
+          <a:lstStyle/>
+          <a:p>
+            <a:r>
+              <a:rPr lang="en-US" sz="1200" dirty="0" err="1" smtClean="0">
+                <a:latin typeface="Times New Roman"/>
+              </a:rPr>
+              <a:t>y</a:t>
+            </a:r>
+            <a:endParaRPr lang="en-US" sz="1200" baseline="-25000" dirty="0">
+              <a:latin typeface="Times New Roman"/>
+            </a:endParaRPr>
+          </a:p>
+        </p:txBody>
+      </p:sp>
+      <p:sp>
+        <p:nvSpPr>
+          <p:cNvPr id="92" name="TextBox 91"/>
+          <p:cNvSpPr txBox="1"/>
+          <p:nvPr/>
+        </p:nvSpPr>
+        <p:spPr>
+          <a:xfrm>
+            <a:off x="4749759" y="3349377"/>
+            <a:ext cx="714559" cy="276999"/>
+          </a:xfrm>
+          <a:prstGeom prst="rect">
+            <a:avLst/>
+          </a:prstGeom>
+          <a:noFill/>
+        </p:spPr>
+        <p:txBody>
+          <a:bodyPr wrap="none" rtlCol="0">
+            <a:spAutoFit/>
+          </a:bodyPr>
+          <a:lstStyle/>
+          <a:p>
+            <a:r>
+              <a:rPr lang="en-US" sz="1200" dirty="0" smtClean="0"/>
+              <a:t>plant </a:t>
+            </a:r>
+            <a:r>
+              <a:rPr lang="en-US" sz="1200" dirty="0" err="1" smtClean="0"/>
+              <a:t>i/p</a:t>
+            </a:r>
+            <a:endParaRPr lang="en-US" sz="1200" dirty="0"/>
+          </a:p>
+        </p:txBody>
+      </p:sp>
+      <p:sp>
+        <p:nvSpPr>
+          <p:cNvPr id="93" name="TextBox 92"/>
+          <p:cNvSpPr txBox="1"/>
+          <p:nvPr/>
+        </p:nvSpPr>
+        <p:spPr>
+          <a:xfrm>
+            <a:off x="7251421" y="3290500"/>
+            <a:ext cx="611465" cy="276999"/>
+          </a:xfrm>
+          <a:prstGeom prst="rect">
+            <a:avLst/>
+          </a:prstGeom>
+          <a:noFill/>
+        </p:spPr>
+        <p:txBody>
+          <a:bodyPr wrap="none" rtlCol="0">
+            <a:spAutoFit/>
+          </a:bodyPr>
+          <a:lstStyle/>
+          <a:p>
+            <a:r>
+              <a:rPr lang="en-US" sz="1200" dirty="0" smtClean="0"/>
+              <a:t>output</a:t>
+            </a:r>
+            <a:endParaRPr lang="en-US" sz="1200" dirty="0"/>
+          </a:p>
+        </p:txBody>
+      </p:sp>
+      <p:sp>
+        <p:nvSpPr>
+          <p:cNvPr id="94" name="TextBox 93"/>
+          <p:cNvSpPr txBox="1"/>
+          <p:nvPr/>
+        </p:nvSpPr>
+        <p:spPr>
+          <a:xfrm>
+            <a:off x="11311306" y="2786721"/>
+            <a:ext cx="611465" cy="276999"/>
+          </a:xfrm>
+          <a:prstGeom prst="rect">
+            <a:avLst/>
+          </a:prstGeom>
+          <a:noFill/>
+        </p:spPr>
+        <p:txBody>
+          <a:bodyPr wrap="none" rtlCol="0">
+            <a:spAutoFit/>
+          </a:bodyPr>
+          <a:lstStyle/>
+          <a:p>
+            <a:r>
+              <a:rPr lang="en-US" sz="1200" dirty="0" smtClean="0"/>
+              <a:t>output</a:t>
+            </a:r>
+            <a:endParaRPr lang="en-US" sz="1200" dirty="0"/>
+          </a:p>
+        </p:txBody>
+      </p:sp>
+      <p:sp>
+        <p:nvSpPr>
+          <p:cNvPr id="95" name="TextBox 94"/>
+          <p:cNvSpPr txBox="1"/>
+          <p:nvPr/>
+        </p:nvSpPr>
+        <p:spPr>
+          <a:xfrm>
+            <a:off x="7638543" y="4449109"/>
+            <a:ext cx="597489" cy="276999"/>
+          </a:xfrm>
+          <a:prstGeom prst="rect">
+            <a:avLst/>
+          </a:prstGeom>
+          <a:noFill/>
+        </p:spPr>
+        <p:txBody>
+          <a:bodyPr wrap="none" rtlCol="0">
+            <a:spAutoFit/>
+          </a:bodyPr>
+          <a:lstStyle/>
+          <a:p>
+            <a:r>
+              <a:rPr lang="en-US" sz="1200" dirty="0" smtClean="0"/>
+              <a:t>ref. </a:t>
+            </a:r>
+            <a:r>
+              <a:rPr lang="en-US" sz="1200" dirty="0" err="1" smtClean="0"/>
+              <a:t>i/p</a:t>
+            </a:r>
+            <a:endParaRPr lang="en-US" sz="1200" dirty="0"/>
+          </a:p>
+        </p:txBody>
+      </p:sp>
+      <p:sp>
+        <p:nvSpPr>
+          <p:cNvPr id="97" name="TextBox 96"/>
+          <p:cNvSpPr txBox="1"/>
+          <p:nvPr/>
+        </p:nvSpPr>
+        <p:spPr>
+          <a:xfrm>
+            <a:off x="5192226" y="5045019"/>
+            <a:ext cx="816600" cy="461665"/>
+          </a:xfrm>
+          <a:prstGeom prst="rect">
+            <a:avLst/>
+          </a:prstGeom>
+          <a:noFill/>
+        </p:spPr>
+        <p:txBody>
+          <a:bodyPr wrap="none" rtlCol="0">
+            <a:spAutoFit/>
+          </a:bodyPr>
+          <a:lstStyle/>
+          <a:p>
+            <a:r>
+              <a:rPr lang="en-US" sz="1200" dirty="0" smtClean="0"/>
+              <a:t>measured</a:t>
+            </a:r>
+          </a:p>
+          <a:p>
+            <a:r>
+              <a:rPr lang="en-US" sz="1200" dirty="0" smtClean="0"/>
+              <a:t>states</a:t>
+            </a:r>
+            <a:endParaRPr lang="en-US" sz="1200" dirty="0"/>
+          </a:p>
+        </p:txBody>
+      </p:sp>
+      <p:sp>
+        <p:nvSpPr>
+          <p:cNvPr id="99" name="TextBox 98"/>
+          <p:cNvSpPr txBox="1"/>
+          <p:nvPr/>
+        </p:nvSpPr>
+        <p:spPr>
+          <a:xfrm>
+            <a:off x="7568870" y="4753295"/>
+            <a:ext cx="274434" cy="276999"/>
+          </a:xfrm>
+          <a:prstGeom prst="rect">
+            <a:avLst/>
+          </a:prstGeom>
+          <a:noFill/>
+        </p:spPr>
+        <p:txBody>
+          <a:bodyPr wrap="none" rtlCol="0">
+            <a:spAutoFit/>
+          </a:bodyPr>
+          <a:lstStyle/>
+          <a:p>
+            <a:r>
+              <a:rPr lang="en-US" sz="1200" dirty="0" smtClean="0">
+                <a:latin typeface="Symbol"/>
+              </a:rPr>
+              <a:t>+</a:t>
+            </a:r>
+            <a:endParaRPr lang="en-US" sz="1200" dirty="0">
+              <a:latin typeface="Symbol"/>
+            </a:endParaRPr>
+          </a:p>
+        </p:txBody>
+      </p:sp>
+      <p:sp>
+        <p:nvSpPr>
+          <p:cNvPr id="100" name="TextBox 99"/>
+          <p:cNvSpPr txBox="1"/>
+          <p:nvPr/>
+        </p:nvSpPr>
+        <p:spPr>
+          <a:xfrm>
+            <a:off x="7465688" y="4465819"/>
+            <a:ext cx="261610" cy="276999"/>
+          </a:xfrm>
+          <a:prstGeom prst="rect">
+            <a:avLst/>
+          </a:prstGeom>
+          <a:noFill/>
+        </p:spPr>
+        <p:txBody>
+          <a:bodyPr wrap="none" rtlCol="0">
+            <a:spAutoFit/>
+          </a:bodyPr>
+          <a:lstStyle/>
+          <a:p>
+            <a:r>
+              <a:rPr lang="en-US" sz="1200" dirty="0" smtClean="0">
+                <a:latin typeface="Symbol"/>
+              </a:rPr>
+              <a:t>-</a:t>
+            </a:r>
+            <a:endParaRPr lang="en-US" sz="1200" dirty="0">
+              <a:latin typeface="Symbol"/>
+            </a:endParaRPr>
+          </a:p>
+        </p:txBody>
+      </p:sp>
+      <p:sp>
+        <p:nvSpPr>
+          <p:cNvPr id="104" name="Rectangle 103"/>
+          <p:cNvSpPr/>
+          <p:nvPr/>
+        </p:nvSpPr>
+        <p:spPr>
+          <a:xfrm>
+            <a:off x="6543762" y="1034829"/>
+            <a:ext cx="630933" cy="453558"/>
+          </a:xfrm>
+          <a:prstGeom prst="rect">
+            <a:avLst/>
+          </a:prstGeom>
+          <a:noFill/>
+          <a:ln>
+            <a:solidFill>
+              <a:schemeClr val="tx1"/>
+            </a:solidFill>
+          </a:ln>
+          <a:effectLst/>
+        </p:spPr>
+        <p:style>
+          <a:lnRef idx="1">
+            <a:schemeClr val="accent1"/>
+          </a:lnRef>
+          <a:fillRef idx="3">
+            <a:schemeClr val="accent1"/>
+          </a:fillRef>
+          <a:effectRef idx="2">
+            <a:schemeClr val="accent1"/>
+          </a:effectRef>
+          <a:fontRef idx="minor">
+            <a:schemeClr val="lt1"/>
+          </a:fontRef>
+        </p:style>
+        <p:txBody>
+          <a:bodyPr rtlCol="0" anchor="ctr"/>
+          <a:lstStyle/>
+          <a:p>
+            <a:pPr algn="ctr"/>
+            <a:endParaRPr lang="en-US"/>
+          </a:p>
+        </p:txBody>
+      </p:sp>
+      <p:sp>
+        <p:nvSpPr>
+          <p:cNvPr id="105" name="TextBox 104"/>
+          <p:cNvSpPr txBox="1"/>
+          <p:nvPr/>
+        </p:nvSpPr>
+        <p:spPr>
+          <a:xfrm>
+            <a:off x="6698455" y="1123109"/>
+            <a:ext cx="325730" cy="276999"/>
+          </a:xfrm>
+          <a:prstGeom prst="rect">
+            <a:avLst/>
+          </a:prstGeom>
+          <a:noFill/>
+        </p:spPr>
+        <p:txBody>
+          <a:bodyPr wrap="none" rtlCol="0">
+            <a:spAutoFit/>
+          </a:bodyPr>
+          <a:lstStyle/>
+          <a:p>
+            <a:r>
+              <a:rPr lang="en-US" sz="1200" b="1" dirty="0" smtClean="0">
+                <a:latin typeface="Times New Roman"/>
+              </a:rPr>
+              <a:t>S</a:t>
+            </a:r>
+            <a:r>
+              <a:rPr lang="en-US" sz="1200" baseline="-25000" dirty="0" smtClean="0">
+                <a:latin typeface="Times New Roman"/>
+              </a:rPr>
+              <a:t>2</a:t>
+            </a:r>
+            <a:endParaRPr lang="en-US" sz="1200" baseline="-25000" dirty="0">
+              <a:latin typeface="Times New Roman"/>
+            </a:endParaRPr>
+          </a:p>
+        </p:txBody>
+      </p:sp>
+      <p:sp>
+        <p:nvSpPr>
+          <p:cNvPr id="106" name="Rectangle 105"/>
+          <p:cNvSpPr/>
+          <p:nvPr/>
+        </p:nvSpPr>
+        <p:spPr>
+          <a:xfrm>
+            <a:off x="6543762" y="1640787"/>
+            <a:ext cx="630933" cy="453558"/>
+          </a:xfrm>
+          <a:prstGeom prst="rect">
+            <a:avLst/>
+          </a:prstGeom>
+          <a:noFill/>
+          <a:ln>
+            <a:solidFill>
+              <a:schemeClr val="tx1"/>
+            </a:solidFill>
+          </a:ln>
+          <a:effectLst/>
+        </p:spPr>
+        <p:style>
+          <a:lnRef idx="1">
+            <a:schemeClr val="accent1"/>
+          </a:lnRef>
+          <a:fillRef idx="3">
+            <a:schemeClr val="accent1"/>
+          </a:fillRef>
+          <a:effectRef idx="2">
+            <a:schemeClr val="accent1"/>
+          </a:effectRef>
+          <a:fontRef idx="minor">
+            <a:schemeClr val="lt1"/>
+          </a:fontRef>
+        </p:style>
+        <p:txBody>
+          <a:bodyPr rtlCol="0" anchor="ctr"/>
+          <a:lstStyle/>
+          <a:p>
+            <a:pPr algn="ctr"/>
+            <a:endParaRPr lang="en-US"/>
+          </a:p>
+        </p:txBody>
+      </p:sp>
+      <p:sp>
+        <p:nvSpPr>
+          <p:cNvPr id="107" name="TextBox 106"/>
+          <p:cNvSpPr txBox="1"/>
+          <p:nvPr/>
+        </p:nvSpPr>
+        <p:spPr>
+          <a:xfrm>
+            <a:off x="6698455" y="1729067"/>
+            <a:ext cx="325730" cy="276999"/>
+          </a:xfrm>
+          <a:prstGeom prst="rect">
+            <a:avLst/>
+          </a:prstGeom>
+          <a:noFill/>
+        </p:spPr>
+        <p:txBody>
+          <a:bodyPr wrap="none" rtlCol="0">
+            <a:spAutoFit/>
+          </a:bodyPr>
+          <a:lstStyle/>
+          <a:p>
+            <a:r>
+              <a:rPr lang="en-US" sz="1200" b="1" dirty="0" smtClean="0">
+                <a:latin typeface="Times New Roman"/>
+              </a:rPr>
+              <a:t>S</a:t>
+            </a:r>
+            <a:r>
+              <a:rPr lang="en-US" sz="1200" baseline="-25000" dirty="0" smtClean="0">
+                <a:latin typeface="Times New Roman"/>
+              </a:rPr>
+              <a:t>3</a:t>
+            </a:r>
+            <a:endParaRPr lang="en-US" sz="1200" baseline="-25000" dirty="0">
+              <a:latin typeface="Times New Roman"/>
+            </a:endParaRPr>
+          </a:p>
+        </p:txBody>
+      </p:sp>
+      <p:sp>
+        <p:nvSpPr>
+          <p:cNvPr id="108" name="Rectangle 107"/>
+          <p:cNvSpPr/>
+          <p:nvPr/>
+        </p:nvSpPr>
+        <p:spPr>
+          <a:xfrm>
+            <a:off x="6543762" y="2246745"/>
+            <a:ext cx="630933" cy="453558"/>
+          </a:xfrm>
+          <a:prstGeom prst="rect">
+            <a:avLst/>
+          </a:prstGeom>
+          <a:noFill/>
+          <a:ln>
+            <a:solidFill>
+              <a:schemeClr val="tx1"/>
+            </a:solidFill>
+          </a:ln>
+          <a:effectLst/>
+        </p:spPr>
+        <p:style>
+          <a:lnRef idx="1">
+            <a:schemeClr val="accent1"/>
+          </a:lnRef>
+          <a:fillRef idx="3">
+            <a:schemeClr val="accent1"/>
+          </a:fillRef>
+          <a:effectRef idx="2">
+            <a:schemeClr val="accent1"/>
+          </a:effectRef>
+          <a:fontRef idx="minor">
+            <a:schemeClr val="lt1"/>
+          </a:fontRef>
+        </p:style>
+        <p:txBody>
+          <a:bodyPr rtlCol="0" anchor="ctr"/>
+          <a:lstStyle/>
+          <a:p>
+            <a:pPr algn="ctr"/>
+            <a:endParaRPr lang="en-US"/>
+          </a:p>
+        </p:txBody>
+      </p:sp>
+      <p:sp>
+        <p:nvSpPr>
+          <p:cNvPr id="109" name="TextBox 108"/>
+          <p:cNvSpPr txBox="1"/>
+          <p:nvPr/>
+        </p:nvSpPr>
+        <p:spPr>
+          <a:xfrm>
+            <a:off x="6698455" y="2335025"/>
+            <a:ext cx="325730" cy="276999"/>
+          </a:xfrm>
+          <a:prstGeom prst="rect">
+            <a:avLst/>
+          </a:prstGeom>
+          <a:noFill/>
+        </p:spPr>
+        <p:txBody>
+          <a:bodyPr wrap="none" rtlCol="0">
+            <a:spAutoFit/>
+          </a:bodyPr>
+          <a:lstStyle/>
+          <a:p>
+            <a:r>
+              <a:rPr lang="en-US" sz="1200" b="1" dirty="0" smtClean="0">
+                <a:latin typeface="Times New Roman"/>
+              </a:rPr>
+              <a:t>S</a:t>
+            </a:r>
+            <a:r>
+              <a:rPr lang="en-US" sz="1200" baseline="-25000" dirty="0" smtClean="0">
+                <a:latin typeface="Times New Roman"/>
+              </a:rPr>
+              <a:t>4</a:t>
+            </a:r>
+            <a:endParaRPr lang="en-US" sz="1200" baseline="-25000" dirty="0">
+              <a:latin typeface="Times New Roman"/>
+            </a:endParaRPr>
+          </a:p>
+        </p:txBody>
+      </p:sp>
+      <p:cxnSp>
+        <p:nvCxnSpPr>
+          <p:cNvPr id="113" name="Straight Connector 112"/>
+          <p:cNvCxnSpPr/>
+          <p:nvPr/>
+        </p:nvCxnSpPr>
+        <p:spPr>
+          <a:xfrm>
+            <a:off x="7174695" y="2459891"/>
+            <a:ext cx="214426" cy="1588"/>
+          </a:xfrm>
+          <a:prstGeom prst="line">
+            <a:avLst/>
+          </a:prstGeom>
+          <a:ln w="12700">
+            <a:solidFill>
+              <a:schemeClr val="tx1"/>
+            </a:solidFill>
+          </a:ln>
+          <a:effectLst/>
+        </p:spPr>
+        <p:style>
+          <a:lnRef idx="2">
+            <a:schemeClr val="accent1"/>
+          </a:lnRef>
+          <a:fillRef idx="0">
+            <a:schemeClr val="accent1"/>
+          </a:fillRef>
+          <a:effectRef idx="1">
+            <a:schemeClr val="accent1"/>
+          </a:effectRef>
+          <a:fontRef idx="minor">
+            <a:schemeClr val="tx1"/>
+          </a:fontRef>
+        </p:style>
+      </p:cxnSp>
+      <p:cxnSp>
+        <p:nvCxnSpPr>
+          <p:cNvPr id="114" name="Straight Connector 113"/>
+          <p:cNvCxnSpPr/>
+          <p:nvPr/>
+        </p:nvCxnSpPr>
+        <p:spPr>
+          <a:xfrm>
+            <a:off x="6329336" y="2461479"/>
+            <a:ext cx="214426" cy="1588"/>
+          </a:xfrm>
+          <a:prstGeom prst="line">
+            <a:avLst/>
+          </a:prstGeom>
+          <a:ln w="12700">
+            <a:solidFill>
+              <a:schemeClr val="tx1"/>
+            </a:solidFill>
+          </a:ln>
+          <a:effectLst/>
+        </p:spPr>
+        <p:style>
+          <a:lnRef idx="2">
+            <a:schemeClr val="accent1"/>
+          </a:lnRef>
+          <a:fillRef idx="0">
+            <a:schemeClr val="accent1"/>
+          </a:fillRef>
+          <a:effectRef idx="1">
+            <a:schemeClr val="accent1"/>
+          </a:effectRef>
+          <a:fontRef idx="minor">
+            <a:schemeClr val="tx1"/>
+          </a:fontRef>
+        </p:style>
+      </p:cxnSp>
+      <p:cxnSp>
+        <p:nvCxnSpPr>
+          <p:cNvPr id="116" name="Straight Connector 115"/>
+          <p:cNvCxnSpPr/>
+          <p:nvPr/>
+        </p:nvCxnSpPr>
+        <p:spPr>
+          <a:xfrm>
+            <a:off x="6329336" y="1865978"/>
+            <a:ext cx="214426" cy="1588"/>
+          </a:xfrm>
+          <a:prstGeom prst="line">
+            <a:avLst/>
+          </a:prstGeom>
+          <a:ln w="12700">
+            <a:solidFill>
+              <a:schemeClr val="tx1"/>
+            </a:solidFill>
+          </a:ln>
+          <a:effectLst/>
+        </p:spPr>
+        <p:style>
+          <a:lnRef idx="2">
+            <a:schemeClr val="accent1"/>
+          </a:lnRef>
+          <a:fillRef idx="0">
+            <a:schemeClr val="accent1"/>
+          </a:fillRef>
+          <a:effectRef idx="1">
+            <a:schemeClr val="accent1"/>
+          </a:effectRef>
+          <a:fontRef idx="minor">
+            <a:schemeClr val="tx1"/>
+          </a:fontRef>
+        </p:style>
+      </p:cxnSp>
+      <p:sp>
+        <p:nvSpPr>
+          <p:cNvPr id="118" name="TextBox 117"/>
+          <p:cNvSpPr txBox="1"/>
+          <p:nvPr/>
+        </p:nvSpPr>
+        <p:spPr>
+          <a:xfrm>
+            <a:off x="8217986" y="1087527"/>
             <a:ext cx="274434" cy="276999"/>
           </a:xfrm>
           <a:prstGeom prst="rect">
@@ -10295,6 +11638,615 @@
       </p:par>
     </p:tnLst>
   </p:timing>
+</p:sld>
+</file>
+
+<file path=ppt/slides/slide20.xml><?xml version="1.0" encoding="utf-8"?>
+<p:sld xmlns:a="http://schemas.openxmlformats.org/drawingml/2006/main" xmlns:r="http://schemas.openxmlformats.org/officeDocument/2006/relationships" xmlns:mc="http://schemas.openxmlformats.org/markup-compatibility/2006" xmlns:mv="urn:schemas-microsoft-com:mac:vml" xmlns:p="http://schemas.openxmlformats.org/presentationml/2006/main" mc:Ignorable="mv" mc:PreserveAttributes="mv:*">
+  <p:cSld>
+    <p:spTree>
+      <p:nvGrpSpPr>
+        <p:cNvPr id="1" name=""/>
+        <p:cNvGrpSpPr/>
+        <p:nvPr/>
+      </p:nvGrpSpPr>
+      <p:grpSpPr>
+        <a:xfrm>
+          <a:off x="0" y="0"/>
+          <a:ext cx="0" cy="0"/>
+          <a:chOff x="0" y="0"/>
+          <a:chExt cx="0" cy="0"/>
+        </a:xfrm>
+      </p:grpSpPr>
+      <p:sp>
+        <p:nvSpPr>
+          <p:cNvPr id="2" name="Title 1"/>
+          <p:cNvSpPr>
+            <a:spLocks noGrp="1"/>
+          </p:cNvSpPr>
+          <p:nvPr>
+            <p:ph type="title"/>
+          </p:nvPr>
+        </p:nvSpPr>
+        <p:spPr/>
+        <p:txBody>
+          <a:bodyPr/>
+          <a:lstStyle/>
+          <a:p>
+            <a:endParaRPr lang="en-US"/>
+          </a:p>
+        </p:txBody>
+      </p:sp>
+      <p:grpSp>
+        <p:nvGrpSpPr>
+          <p:cNvPr id="19" name="Group 18"/>
+          <p:cNvGrpSpPr/>
+          <p:nvPr/>
+        </p:nvGrpSpPr>
+        <p:grpSpPr>
+          <a:xfrm>
+            <a:off x="1150367" y="2630120"/>
+            <a:ext cx="4274339" cy="1517871"/>
+            <a:chOff x="1150367" y="2630120"/>
+            <a:chExt cx="4274339" cy="1517871"/>
+          </a:xfrm>
+        </p:grpSpPr>
+        <p:grpSp>
+          <p:nvGrpSpPr>
+            <p:cNvPr id="4" name="Group 3"/>
+            <p:cNvGrpSpPr/>
+            <p:nvPr/>
+          </p:nvGrpSpPr>
+          <p:grpSpPr>
+            <a:xfrm>
+              <a:off x="1311829" y="2630120"/>
+              <a:ext cx="4112877" cy="1517871"/>
+              <a:chOff x="2460134" y="184672"/>
+              <a:chExt cx="4112877" cy="1517871"/>
+            </a:xfrm>
+          </p:grpSpPr>
+          <p:cxnSp>
+            <p:nvCxnSpPr>
+              <p:cNvPr id="5" name="Straight Arrow Connector 4"/>
+              <p:cNvCxnSpPr/>
+              <p:nvPr/>
+            </p:nvCxnSpPr>
+            <p:spPr>
+              <a:xfrm>
+                <a:off x="5473628" y="476243"/>
+                <a:ext cx="1099383" cy="1588"/>
+              </a:xfrm>
+              <a:prstGeom prst="straightConnector1">
+                <a:avLst/>
+              </a:prstGeom>
+              <a:ln w="12700">
+                <a:solidFill>
+                  <a:schemeClr val="tx1"/>
+                </a:solidFill>
+                <a:tailEnd type="triangle"/>
+              </a:ln>
+              <a:effectLst/>
+            </p:spPr>
+            <p:style>
+              <a:lnRef idx="2">
+                <a:schemeClr val="accent1"/>
+              </a:lnRef>
+              <a:fillRef idx="0">
+                <a:schemeClr val="accent1"/>
+              </a:fillRef>
+              <a:effectRef idx="1">
+                <a:schemeClr val="accent1"/>
+              </a:effectRef>
+              <a:fontRef idx="minor">
+                <a:schemeClr val="tx1"/>
+              </a:fontRef>
+            </p:style>
+          </p:cxnSp>
+          <p:cxnSp>
+            <p:nvCxnSpPr>
+              <p:cNvPr id="6" name="Elbow Connector 109"/>
+              <p:cNvCxnSpPr>
+                <a:endCxn id="11" idx="3"/>
+              </p:cNvCxnSpPr>
+              <p:nvPr/>
+            </p:nvCxnSpPr>
+            <p:spPr>
+              <a:xfrm rot="5400000">
+                <a:off x="5271840" y="690019"/>
+                <a:ext cx="923864" cy="496315"/>
+              </a:xfrm>
+              <a:prstGeom prst="bentConnector2">
+                <a:avLst/>
+              </a:prstGeom>
+              <a:ln w="12700">
+                <a:solidFill>
+                  <a:schemeClr val="tx1"/>
+                </a:solidFill>
+                <a:tailEnd type="triangle"/>
+              </a:ln>
+              <a:effectLst/>
+            </p:spPr>
+            <p:style>
+              <a:lnRef idx="2">
+                <a:schemeClr val="accent1"/>
+              </a:lnRef>
+              <a:fillRef idx="0">
+                <a:schemeClr val="accent1"/>
+              </a:fillRef>
+              <a:effectRef idx="1">
+                <a:schemeClr val="accent1"/>
+              </a:effectRef>
+              <a:fontRef idx="minor">
+                <a:schemeClr val="tx1"/>
+              </a:fontRef>
+            </p:style>
+          </p:cxnSp>
+          <p:cxnSp>
+            <p:nvCxnSpPr>
+              <p:cNvPr id="7" name="Straight Arrow Connector 6"/>
+              <p:cNvCxnSpPr>
+                <a:stCxn id="13" idx="6"/>
+              </p:cNvCxnSpPr>
+              <p:nvPr/>
+            </p:nvCxnSpPr>
+            <p:spPr>
+              <a:xfrm>
+                <a:off x="3275814" y="479419"/>
+                <a:ext cx="537173" cy="1"/>
+              </a:xfrm>
+              <a:prstGeom prst="straightConnector1">
+                <a:avLst/>
+              </a:prstGeom>
+              <a:ln w="12700">
+                <a:solidFill>
+                  <a:schemeClr val="tx1"/>
+                </a:solidFill>
+                <a:tailEnd type="triangle"/>
+              </a:ln>
+              <a:effectLst/>
+            </p:spPr>
+            <p:style>
+              <a:lnRef idx="2">
+                <a:schemeClr val="accent1"/>
+              </a:lnRef>
+              <a:fillRef idx="0">
+                <a:schemeClr val="accent1"/>
+              </a:fillRef>
+              <a:effectRef idx="1">
+                <a:schemeClr val="accent1"/>
+              </a:effectRef>
+              <a:fontRef idx="minor">
+                <a:schemeClr val="tx1"/>
+              </a:fontRef>
+            </p:style>
+          </p:cxnSp>
+          <p:cxnSp>
+            <p:nvCxnSpPr>
+              <p:cNvPr id="8" name="Elbow Connector 33"/>
+              <p:cNvCxnSpPr/>
+              <p:nvPr/>
+            </p:nvCxnSpPr>
+            <p:spPr>
+              <a:xfrm rot="10800000">
+                <a:off x="3140608" y="644111"/>
+                <a:ext cx="658796" cy="781435"/>
+              </a:xfrm>
+              <a:prstGeom prst="bentConnector2">
+                <a:avLst/>
+              </a:prstGeom>
+              <a:ln w="12700">
+                <a:solidFill>
+                  <a:schemeClr val="tx1"/>
+                </a:solidFill>
+                <a:tailEnd type="triangle"/>
+              </a:ln>
+              <a:effectLst/>
+            </p:spPr>
+            <p:style>
+              <a:lnRef idx="2">
+                <a:schemeClr val="accent1"/>
+              </a:lnRef>
+              <a:fillRef idx="0">
+                <a:schemeClr val="accent1"/>
+              </a:fillRef>
+              <a:effectRef idx="1">
+                <a:schemeClr val="accent1"/>
+              </a:effectRef>
+              <a:fontRef idx="minor">
+                <a:schemeClr val="tx1"/>
+              </a:fontRef>
+            </p:style>
+          </p:cxnSp>
+          <p:sp>
+            <p:nvSpPr>
+              <p:cNvPr id="9" name="Rectangle 8"/>
+              <p:cNvSpPr/>
+              <p:nvPr/>
+            </p:nvSpPr>
+            <p:spPr>
+              <a:xfrm>
+                <a:off x="3799404" y="184672"/>
+                <a:ext cx="1674224" cy="604871"/>
+              </a:xfrm>
+              <a:prstGeom prst="rect">
+                <a:avLst/>
+              </a:prstGeom>
+              <a:noFill/>
+              <a:ln>
+                <a:solidFill>
+                  <a:schemeClr val="tx1"/>
+                </a:solidFill>
+              </a:ln>
+              <a:effectLst/>
+            </p:spPr>
+            <p:style>
+              <a:lnRef idx="1">
+                <a:schemeClr val="accent1"/>
+              </a:lnRef>
+              <a:fillRef idx="3">
+                <a:schemeClr val="accent1"/>
+              </a:fillRef>
+              <a:effectRef idx="2">
+                <a:schemeClr val="accent1"/>
+              </a:effectRef>
+              <a:fontRef idx="minor">
+                <a:schemeClr val="lt1"/>
+              </a:fontRef>
+            </p:style>
+            <p:txBody>
+              <a:bodyPr rtlCol="0" anchor="ctr"/>
+              <a:lstStyle/>
+              <a:p>
+                <a:pPr algn="ctr"/>
+                <a:endParaRPr lang="en-US"/>
+              </a:p>
+            </p:txBody>
+          </p:sp>
+          <p:graphicFrame>
+            <p:nvGraphicFramePr>
+              <p:cNvPr id="10" name="Object 9"/>
+              <p:cNvGraphicFramePr>
+                <a:graphicFrameLocks noChangeAspect="1"/>
+              </p:cNvGraphicFramePr>
+              <p:nvPr/>
+            </p:nvGraphicFramePr>
+            <p:xfrm>
+              <a:off x="3957066" y="277557"/>
+              <a:ext cx="1358900" cy="419100"/>
+            </p:xfrm>
+            <a:graphic>
+              <a:graphicData uri="http://schemas.openxmlformats.org/presentationml/2006/ole">
+                <p:oleObj spid="_x0000_s57346" name="Equation" r:id="rId3" imgW="1358900" imgH="419100" progId="Equation.DSMT4">
+                  <p:embed/>
+                </p:oleObj>
+              </a:graphicData>
+            </a:graphic>
+          </p:graphicFrame>
+          <p:sp>
+            <p:nvSpPr>
+              <p:cNvPr id="11" name="Rectangle 10"/>
+              <p:cNvSpPr/>
+              <p:nvPr/>
+            </p:nvSpPr>
+            <p:spPr>
+              <a:xfrm>
+                <a:off x="3811390" y="1097672"/>
+                <a:ext cx="1674224" cy="604871"/>
+              </a:xfrm>
+              <a:prstGeom prst="rect">
+                <a:avLst/>
+              </a:prstGeom>
+              <a:noFill/>
+              <a:ln>
+                <a:solidFill>
+                  <a:schemeClr val="tx1"/>
+                </a:solidFill>
+              </a:ln>
+              <a:effectLst/>
+            </p:spPr>
+            <p:style>
+              <a:lnRef idx="1">
+                <a:schemeClr val="accent1"/>
+              </a:lnRef>
+              <a:fillRef idx="3">
+                <a:schemeClr val="accent1"/>
+              </a:fillRef>
+              <a:effectRef idx="2">
+                <a:schemeClr val="accent1"/>
+              </a:effectRef>
+              <a:fontRef idx="minor">
+                <a:schemeClr val="lt1"/>
+              </a:fontRef>
+            </p:style>
+            <p:txBody>
+              <a:bodyPr rtlCol="0" anchor="ctr"/>
+              <a:lstStyle/>
+              <a:p>
+                <a:pPr algn="ctr"/>
+                <a:endParaRPr lang="en-US"/>
+              </a:p>
+            </p:txBody>
+          </p:sp>
+          <p:graphicFrame>
+            <p:nvGraphicFramePr>
+              <p:cNvPr id="12" name="Object 11"/>
+              <p:cNvGraphicFramePr>
+                <a:graphicFrameLocks noChangeAspect="1"/>
+              </p:cNvGraphicFramePr>
+              <p:nvPr/>
+            </p:nvGraphicFramePr>
+            <p:xfrm>
+              <a:off x="4025900" y="1203325"/>
+              <a:ext cx="1244600" cy="393700"/>
+            </p:xfrm>
+            <a:graphic>
+              <a:graphicData uri="http://schemas.openxmlformats.org/presentationml/2006/ole">
+                <p:oleObj spid="_x0000_s57347" name="Equation" r:id="rId4" imgW="1244600" imgH="393700" progId="Equation.DSMT4">
+                  <p:embed/>
+                </p:oleObj>
+              </a:graphicData>
+            </a:graphic>
+          </p:graphicFrame>
+          <p:sp>
+            <p:nvSpPr>
+              <p:cNvPr id="13" name="Oval 12"/>
+              <p:cNvSpPr/>
+              <p:nvPr/>
+            </p:nvSpPr>
+            <p:spPr>
+              <a:xfrm>
+                <a:off x="2997307" y="340165"/>
+                <a:ext cx="278507" cy="278507"/>
+              </a:xfrm>
+              <a:prstGeom prst="ellipse">
+                <a:avLst/>
+              </a:prstGeom>
+              <a:noFill/>
+              <a:ln>
+                <a:solidFill>
+                  <a:schemeClr val="tx1"/>
+                </a:solidFill>
+              </a:ln>
+            </p:spPr>
+            <p:style>
+              <a:lnRef idx="1">
+                <a:schemeClr val="accent1"/>
+              </a:lnRef>
+              <a:fillRef idx="3">
+                <a:schemeClr val="accent1"/>
+              </a:fillRef>
+              <a:effectRef idx="2">
+                <a:schemeClr val="accent1"/>
+              </a:effectRef>
+              <a:fontRef idx="minor">
+                <a:schemeClr val="lt1"/>
+              </a:fontRef>
+            </p:style>
+            <p:txBody>
+              <a:bodyPr rtlCol="0" anchor="ctr"/>
+              <a:lstStyle/>
+              <a:p>
+                <a:pPr algn="ctr"/>
+                <a:endParaRPr lang="en-US"/>
+              </a:p>
+            </p:txBody>
+          </p:sp>
+          <p:cxnSp>
+            <p:nvCxnSpPr>
+              <p:cNvPr id="14" name="Straight Arrow Connector 13"/>
+              <p:cNvCxnSpPr/>
+              <p:nvPr/>
+            </p:nvCxnSpPr>
+            <p:spPr>
+              <a:xfrm>
+                <a:off x="2460134" y="479420"/>
+                <a:ext cx="537173" cy="1"/>
+              </a:xfrm>
+              <a:prstGeom prst="straightConnector1">
+                <a:avLst/>
+              </a:prstGeom>
+              <a:ln w="12700">
+                <a:solidFill>
+                  <a:schemeClr val="tx1"/>
+                </a:solidFill>
+                <a:tailEnd type="triangle"/>
+              </a:ln>
+              <a:effectLst/>
+            </p:spPr>
+            <p:style>
+              <a:lnRef idx="2">
+                <a:schemeClr val="accent1"/>
+              </a:lnRef>
+              <a:fillRef idx="0">
+                <a:schemeClr val="accent1"/>
+              </a:fillRef>
+              <a:effectRef idx="1">
+                <a:schemeClr val="accent1"/>
+              </a:effectRef>
+              <a:fontRef idx="minor">
+                <a:schemeClr val="tx1"/>
+              </a:fontRef>
+            </p:style>
+          </p:cxnSp>
+          <p:sp>
+            <p:nvSpPr>
+              <p:cNvPr id="15" name="TextBox 14"/>
+              <p:cNvSpPr txBox="1"/>
+              <p:nvPr/>
+            </p:nvSpPr>
+            <p:spPr>
+              <a:xfrm>
+                <a:off x="2888156" y="558157"/>
+                <a:ext cx="261610" cy="276999"/>
+              </a:xfrm>
+              <a:prstGeom prst="rect">
+                <a:avLst/>
+              </a:prstGeom>
+              <a:noFill/>
+            </p:spPr>
+            <p:txBody>
+              <a:bodyPr wrap="none" rtlCol="0">
+                <a:spAutoFit/>
+              </a:bodyPr>
+              <a:lstStyle/>
+              <a:p>
+                <a:r>
+                  <a:rPr lang="en-US" sz="1200" dirty="0" smtClean="0">
+                    <a:latin typeface="Symbol"/>
+                  </a:rPr>
+                  <a:t>-</a:t>
+                </a:r>
+                <a:endParaRPr lang="en-US" sz="1200" dirty="0">
+                  <a:latin typeface="Symbol"/>
+                </a:endParaRPr>
+              </a:p>
+            </p:txBody>
+          </p:sp>
+          <p:sp>
+            <p:nvSpPr>
+              <p:cNvPr id="16" name="TextBox 15"/>
+              <p:cNvSpPr txBox="1"/>
+              <p:nvPr/>
+            </p:nvSpPr>
+            <p:spPr>
+              <a:xfrm>
+                <a:off x="2750939" y="202422"/>
+                <a:ext cx="274434" cy="276999"/>
+              </a:xfrm>
+              <a:prstGeom prst="rect">
+                <a:avLst/>
+              </a:prstGeom>
+              <a:noFill/>
+            </p:spPr>
+            <p:txBody>
+              <a:bodyPr wrap="none" rtlCol="0">
+                <a:spAutoFit/>
+              </a:bodyPr>
+              <a:lstStyle/>
+              <a:p>
+                <a:r>
+                  <a:rPr lang="en-US" sz="1200" dirty="0" smtClean="0">
+                    <a:latin typeface="Symbol"/>
+                  </a:rPr>
+                  <a:t>+</a:t>
+                </a:r>
+                <a:endParaRPr lang="en-US" sz="1200" dirty="0">
+                  <a:latin typeface="Symbol"/>
+                </a:endParaRPr>
+              </a:p>
+            </p:txBody>
+          </p:sp>
+        </p:grpSp>
+        <p:sp>
+          <p:nvSpPr>
+            <p:cNvPr id="17" name="TextBox 16"/>
+            <p:cNvSpPr txBox="1"/>
+            <p:nvPr/>
+          </p:nvSpPr>
+          <p:spPr>
+            <a:xfrm>
+              <a:off x="1150367" y="2647870"/>
+              <a:ext cx="452267" cy="276999"/>
+            </a:xfrm>
+            <a:prstGeom prst="rect">
+              <a:avLst/>
+            </a:prstGeom>
+            <a:noFill/>
+          </p:spPr>
+          <p:txBody>
+            <a:bodyPr wrap="none" rtlCol="0">
+              <a:spAutoFit/>
+            </a:bodyPr>
+            <a:lstStyle/>
+            <a:p>
+              <a:r>
+                <a:rPr lang="en-US" sz="1200" i="1" dirty="0" err="1" smtClean="0">
+                  <a:latin typeface="Times New Roman"/>
+                </a:rPr>
+                <a:t>R</a:t>
+              </a:r>
+              <a:r>
+                <a:rPr lang="en-US" sz="1200" dirty="0" err="1" smtClean="0">
+                  <a:latin typeface="Times New Roman"/>
+                </a:rPr>
+                <a:t>(</a:t>
+              </a:r>
+              <a:r>
+                <a:rPr lang="en-US" sz="1200" i="1" dirty="0" err="1" smtClean="0">
+                  <a:latin typeface="Times New Roman"/>
+                </a:rPr>
+                <a:t>s</a:t>
+              </a:r>
+              <a:r>
+                <a:rPr lang="en-US" sz="1200" dirty="0" smtClean="0">
+                  <a:latin typeface="Times New Roman"/>
+                </a:rPr>
+                <a:t>)</a:t>
+              </a:r>
+              <a:endParaRPr lang="en-US" sz="1200" dirty="0">
+                <a:latin typeface="Times New Roman"/>
+              </a:endParaRPr>
+            </a:p>
+          </p:txBody>
+        </p:sp>
+        <p:sp>
+          <p:nvSpPr>
+            <p:cNvPr id="18" name="TextBox 17"/>
+            <p:cNvSpPr txBox="1"/>
+            <p:nvPr/>
+          </p:nvSpPr>
+          <p:spPr>
+            <a:xfrm>
+              <a:off x="4972439" y="2647870"/>
+              <a:ext cx="452267" cy="276999"/>
+            </a:xfrm>
+            <a:prstGeom prst="rect">
+              <a:avLst/>
+            </a:prstGeom>
+            <a:noFill/>
+          </p:spPr>
+          <p:txBody>
+            <a:bodyPr wrap="none" rtlCol="0">
+              <a:spAutoFit/>
+            </a:bodyPr>
+            <a:lstStyle/>
+            <a:p>
+              <a:r>
+                <a:rPr lang="en-US" sz="1200" i="1" dirty="0" err="1" smtClean="0">
+                  <a:latin typeface="Times New Roman"/>
+                </a:rPr>
+                <a:t>Y</a:t>
+              </a:r>
+              <a:r>
+                <a:rPr lang="en-US" sz="1200" dirty="0" err="1" smtClean="0">
+                  <a:latin typeface="Times New Roman"/>
+                </a:rPr>
+                <a:t>(</a:t>
+              </a:r>
+              <a:r>
+                <a:rPr lang="en-US" sz="1200" i="1" dirty="0" err="1" smtClean="0">
+                  <a:latin typeface="Times New Roman"/>
+                </a:rPr>
+                <a:t>s</a:t>
+              </a:r>
+              <a:r>
+                <a:rPr lang="en-US" sz="1200" dirty="0" smtClean="0">
+                  <a:latin typeface="Times New Roman"/>
+                </a:rPr>
+                <a:t>)</a:t>
+              </a:r>
+              <a:endParaRPr lang="en-US" sz="1200" dirty="0">
+                <a:latin typeface="Times New Roman"/>
+              </a:endParaRPr>
+            </a:p>
+          </p:txBody>
+        </p:sp>
+      </p:grpSp>
+    </p:spTree>
+  </p:cSld>
+  <p:clrMapOvr>
+    <a:masterClrMapping/>
+  </p:clrMapOvr>
 </p:sld>
 </file>
 

</xml_diff>